<commit_message>
uploaded figures for presentation
</commit_message>
<xml_diff>
--- a/presentations/2022-02-10/figures/JDR_BON_MCN_bayesian_estimates.pptx
+++ b/presentations/2022-02-10/figures/JDR_BON_MCN_bayesian_estimates.pptx
@@ -3959,8 +3959,8 @@
         </p:nvSpPr>
         <p:spPr>
           <a:xfrm>
-            <a:off x="3728707" y="203486"/>
-            <a:ext cx="2378864" cy="1200329"/>
+            <a:off x="3728706" y="203486"/>
+            <a:ext cx="2507467" cy="1200329"/>
           </a:xfrm>
           <a:prstGeom prst="rect">
             <a:avLst/>
@@ -3980,7 +3980,34 @@
                 </a:solidFill>
                 <a:latin typeface="Helvetica" pitchFamily="2" charset="0"/>
               </a:rPr>
-              <a:t>Home (h) = 0.130 (95% CI 0.108-0.150)</a:t>
+              <a:t>Home (</a:t>
+            </a:r>
+            <a:r>
+              <a:rPr lang="en-US" sz="2400" b="1" i="1" dirty="0" err="1">
+                <a:solidFill>
+                  <a:schemeClr val="accent6"/>
+                </a:solidFill>
+                <a:latin typeface="Helvetica" pitchFamily="2" charset="0"/>
+              </a:rPr>
+              <a:t>h</a:t>
+            </a:r>
+            <a:r>
+              <a:rPr lang="en-US" sz="2400" b="1" i="1" baseline="-25000" dirty="0" err="1">
+                <a:solidFill>
+                  <a:schemeClr val="accent6"/>
+                </a:solidFill>
+                <a:latin typeface="Helvetica" pitchFamily="2" charset="0"/>
+              </a:rPr>
+              <a:t>bon_mcn</a:t>
+            </a:r>
+            <a:r>
+              <a:rPr lang="en-US" sz="2400" b="1" i="1" dirty="0">
+                <a:solidFill>
+                  <a:schemeClr val="accent6"/>
+                </a:solidFill>
+                <a:latin typeface="Helvetica" pitchFamily="2" charset="0"/>
+              </a:rPr>
+              <a:t>) = 0.130 (95% CI 0.108-0.150)</a:t>
             </a:r>
           </a:p>
         </p:txBody>

</xml_diff>